<commit_message>
update figures (grey scale)
Signed-off-by: Atsuko Tominaga <Tominaga_Atsuko@phd.ceu.edu>
</commit_message>
<xml_diff>
--- a/paper/image/material/figures.pptx
+++ b/paper/image/material/figures.pptx
@@ -274,7 +274,7 @@
           <a:p>
             <a:fld id="{BFE94BDB-5724-224D-A21F-9C25E901DB95}" type="datetimeFigureOut">
               <a:rPr lang="en-GB" smtClean="0"/>
-              <a:t>13/04/2022</a:t>
+              <a:t>14/04/2022</a:t>
             </a:fld>
             <a:endParaRPr lang="en-GB"/>
           </a:p>
@@ -472,7 +472,7 @@
           <a:p>
             <a:fld id="{BFE94BDB-5724-224D-A21F-9C25E901DB95}" type="datetimeFigureOut">
               <a:rPr lang="en-GB" smtClean="0"/>
-              <a:t>13/04/2022</a:t>
+              <a:t>14/04/2022</a:t>
             </a:fld>
             <a:endParaRPr lang="en-GB"/>
           </a:p>
@@ -680,7 +680,7 @@
           <a:p>
             <a:fld id="{BFE94BDB-5724-224D-A21F-9C25E901DB95}" type="datetimeFigureOut">
               <a:rPr lang="en-GB" smtClean="0"/>
-              <a:t>13/04/2022</a:t>
+              <a:t>14/04/2022</a:t>
             </a:fld>
             <a:endParaRPr lang="en-GB"/>
           </a:p>
@@ -878,7 +878,7 @@
           <a:p>
             <a:fld id="{BFE94BDB-5724-224D-A21F-9C25E901DB95}" type="datetimeFigureOut">
               <a:rPr lang="en-GB" smtClean="0"/>
-              <a:t>13/04/2022</a:t>
+              <a:t>14/04/2022</a:t>
             </a:fld>
             <a:endParaRPr lang="en-GB"/>
           </a:p>
@@ -1153,7 +1153,7 @@
           <a:p>
             <a:fld id="{BFE94BDB-5724-224D-A21F-9C25E901DB95}" type="datetimeFigureOut">
               <a:rPr lang="en-GB" smtClean="0"/>
-              <a:t>13/04/2022</a:t>
+              <a:t>14/04/2022</a:t>
             </a:fld>
             <a:endParaRPr lang="en-GB"/>
           </a:p>
@@ -1418,7 +1418,7 @@
           <a:p>
             <a:fld id="{BFE94BDB-5724-224D-A21F-9C25E901DB95}" type="datetimeFigureOut">
               <a:rPr lang="en-GB" smtClean="0"/>
-              <a:t>13/04/2022</a:t>
+              <a:t>14/04/2022</a:t>
             </a:fld>
             <a:endParaRPr lang="en-GB"/>
           </a:p>
@@ -1830,7 +1830,7 @@
           <a:p>
             <a:fld id="{BFE94BDB-5724-224D-A21F-9C25E901DB95}" type="datetimeFigureOut">
               <a:rPr lang="en-GB" smtClean="0"/>
-              <a:t>13/04/2022</a:t>
+              <a:t>14/04/2022</a:t>
             </a:fld>
             <a:endParaRPr lang="en-GB"/>
           </a:p>
@@ -1971,7 +1971,7 @@
           <a:p>
             <a:fld id="{BFE94BDB-5724-224D-A21F-9C25E901DB95}" type="datetimeFigureOut">
               <a:rPr lang="en-GB" smtClean="0"/>
-              <a:t>13/04/2022</a:t>
+              <a:t>14/04/2022</a:t>
             </a:fld>
             <a:endParaRPr lang="en-GB"/>
           </a:p>
@@ -2084,7 +2084,7 @@
           <a:p>
             <a:fld id="{BFE94BDB-5724-224D-A21F-9C25E901DB95}" type="datetimeFigureOut">
               <a:rPr lang="en-GB" smtClean="0"/>
-              <a:t>13/04/2022</a:t>
+              <a:t>14/04/2022</a:t>
             </a:fld>
             <a:endParaRPr lang="en-GB"/>
           </a:p>
@@ -2395,7 +2395,7 @@
           <a:p>
             <a:fld id="{BFE94BDB-5724-224D-A21F-9C25E901DB95}" type="datetimeFigureOut">
               <a:rPr lang="en-GB" smtClean="0"/>
-              <a:t>13/04/2022</a:t>
+              <a:t>14/04/2022</a:t>
             </a:fld>
             <a:endParaRPr lang="en-GB"/>
           </a:p>
@@ -2683,7 +2683,7 @@
           <a:p>
             <a:fld id="{BFE94BDB-5724-224D-A21F-9C25E901DB95}" type="datetimeFigureOut">
               <a:rPr lang="en-GB" smtClean="0"/>
-              <a:t>13/04/2022</a:t>
+              <a:t>14/04/2022</a:t>
             </a:fld>
             <a:endParaRPr lang="en-GB"/>
           </a:p>
@@ -2924,7 +2924,7 @@
           <a:p>
             <a:fld id="{BFE94BDB-5724-224D-A21F-9C25E901DB95}" type="datetimeFigureOut">
               <a:rPr lang="en-GB" smtClean="0"/>
-              <a:t>13/04/2022</a:t>
+              <a:t>14/04/2022</a:t>
             </a:fld>
             <a:endParaRPr lang="en-GB"/>
           </a:p>
@@ -3788,7 +3788,7 @@
         </p:nvCxnSpPr>
         <p:spPr>
           <a:xfrm>
-            <a:off x="1039125" y="3508023"/>
+            <a:off x="1046762" y="3508023"/>
             <a:ext cx="2189497" cy="0"/>
           </a:xfrm>
           <a:prstGeom prst="line">
@@ -3831,7 +3831,7 @@
         </p:nvSpPr>
         <p:spPr>
           <a:xfrm>
-            <a:off x="1900476" y="3323357"/>
+            <a:off x="1908113" y="3323357"/>
             <a:ext cx="466794" cy="369332"/>
           </a:xfrm>
           <a:prstGeom prst="rect">
@@ -3942,10 +3942,10 @@
       </p:sp>
       <p:cxnSp>
         <p:nvCxnSpPr>
-          <p:cNvPr id="15" name="Straight Connector 14">
-            <a:extLst>
-              <a:ext uri="{FF2B5EF4-FFF2-40B4-BE49-F238E27FC236}">
-                <a16:creationId xmlns:a16="http://schemas.microsoft.com/office/drawing/2014/main" id="{5B0778A4-55F0-9478-CE8B-0EFD530CD165}"/>
+          <p:cNvPr id="19" name="Straight Connector 18">
+            <a:extLst>
+              <a:ext uri="{FF2B5EF4-FFF2-40B4-BE49-F238E27FC236}">
+                <a16:creationId xmlns:a16="http://schemas.microsoft.com/office/drawing/2014/main" id="{DA91D2E6-8C76-D62C-D566-86191D534AA6}"/>
               </a:ext>
             </a:extLst>
           </p:cNvPr>
@@ -3956,7 +3956,212 @@
         </p:nvCxnSpPr>
         <p:spPr>
           <a:xfrm>
-            <a:off x="8048127" y="4796178"/>
+            <a:off x="3486289" y="3508023"/>
+            <a:ext cx="2189497" cy="0"/>
+          </a:xfrm>
+          <a:prstGeom prst="line">
+            <a:avLst/>
+          </a:prstGeom>
+          <a:ln w="25400" cap="flat">
+            <a:solidFill>
+              <a:schemeClr val="tx1"/>
+            </a:solidFill>
+            <a:headEnd type="oval" w="lg" len="lg"/>
+            <a:tailEnd type="oval" w="lg" len="lg"/>
+          </a:ln>
+        </p:spPr>
+        <p:style>
+          <a:lnRef idx="1">
+            <a:schemeClr val="dk1"/>
+          </a:lnRef>
+          <a:fillRef idx="0">
+            <a:schemeClr val="dk1"/>
+          </a:fillRef>
+          <a:effectRef idx="0">
+            <a:schemeClr val="dk1"/>
+          </a:effectRef>
+          <a:fontRef idx="minor">
+            <a:schemeClr val="tx1"/>
+          </a:fontRef>
+        </p:style>
+      </p:cxnSp>
+      <p:sp>
+        <p:nvSpPr>
+          <p:cNvPr id="20" name="TextBox 19">
+            <a:extLst>
+              <a:ext uri="{FF2B5EF4-FFF2-40B4-BE49-F238E27FC236}">
+                <a16:creationId xmlns:a16="http://schemas.microsoft.com/office/drawing/2014/main" id="{B093F44A-755B-1FA2-8A36-1C3E31C7BF4C}"/>
+              </a:ext>
+            </a:extLst>
+          </p:cNvPr>
+          <p:cNvSpPr txBox="1"/>
+          <p:nvPr/>
+        </p:nvSpPr>
+        <p:spPr>
+          <a:xfrm>
+            <a:off x="4347640" y="3323357"/>
+            <a:ext cx="466794" cy="369332"/>
+          </a:xfrm>
+          <a:prstGeom prst="rect">
+            <a:avLst/>
+          </a:prstGeom>
+          <a:solidFill>
+            <a:schemeClr val="bg1"/>
+          </a:solidFill>
+        </p:spPr>
+        <p:txBody>
+          <a:bodyPr wrap="none" rtlCol="0">
+            <a:spAutoFit/>
+          </a:bodyPr>
+          <a:lstStyle/>
+          <a:p>
+            <a:r>
+              <a:rPr lang="en-US" dirty="0">
+                <a:latin typeface="Helvetica" pitchFamily="2" charset="0"/>
+              </a:rPr>
+              <a:t>(2)</a:t>
+            </a:r>
+          </a:p>
+        </p:txBody>
+      </p:sp>
+      <p:cxnSp>
+        <p:nvCxnSpPr>
+          <p:cNvPr id="23" name="Straight Connector 22">
+            <a:extLst>
+              <a:ext uri="{FF2B5EF4-FFF2-40B4-BE49-F238E27FC236}">
+                <a16:creationId xmlns:a16="http://schemas.microsoft.com/office/drawing/2014/main" id="{5B50780C-FBE1-498C-25A9-15748429A085}"/>
+              </a:ext>
+            </a:extLst>
+          </p:cNvPr>
+          <p:cNvCxnSpPr>
+            <a:cxnSpLocks/>
+          </p:cNvCxnSpPr>
+          <p:nvPr/>
+        </p:nvCxnSpPr>
+        <p:spPr>
+          <a:xfrm>
+            <a:off x="691577" y="4802021"/>
+            <a:ext cx="2189497" cy="0"/>
+          </a:xfrm>
+          <a:prstGeom prst="line">
+            <a:avLst/>
+          </a:prstGeom>
+          <a:ln w="25400" cap="flat">
+            <a:solidFill>
+              <a:schemeClr val="tx1"/>
+            </a:solidFill>
+            <a:headEnd type="oval" w="lg" len="lg"/>
+            <a:tailEnd type="oval" w="lg" len="lg"/>
+          </a:ln>
+        </p:spPr>
+        <p:style>
+          <a:lnRef idx="1">
+            <a:schemeClr val="dk1"/>
+          </a:lnRef>
+          <a:fillRef idx="0">
+            <a:schemeClr val="dk1"/>
+          </a:fillRef>
+          <a:effectRef idx="0">
+            <a:schemeClr val="dk1"/>
+          </a:effectRef>
+          <a:fontRef idx="minor">
+            <a:schemeClr val="tx1"/>
+          </a:fontRef>
+        </p:style>
+      </p:cxnSp>
+      <p:sp>
+        <p:nvSpPr>
+          <p:cNvPr id="24" name="TextBox 23">
+            <a:extLst>
+              <a:ext uri="{FF2B5EF4-FFF2-40B4-BE49-F238E27FC236}">
+                <a16:creationId xmlns:a16="http://schemas.microsoft.com/office/drawing/2014/main" id="{58F537FC-32DA-31F8-078E-4CE307BFBE80}"/>
+              </a:ext>
+            </a:extLst>
+          </p:cNvPr>
+          <p:cNvSpPr txBox="1"/>
+          <p:nvPr/>
+        </p:nvSpPr>
+        <p:spPr>
+          <a:xfrm>
+            <a:off x="1552928" y="4617355"/>
+            <a:ext cx="466794" cy="369332"/>
+          </a:xfrm>
+          <a:prstGeom prst="rect">
+            <a:avLst/>
+          </a:prstGeom>
+          <a:solidFill>
+            <a:schemeClr val="bg1"/>
+          </a:solidFill>
+        </p:spPr>
+        <p:txBody>
+          <a:bodyPr wrap="none" rtlCol="0">
+            <a:spAutoFit/>
+          </a:bodyPr>
+          <a:lstStyle/>
+          <a:p>
+            <a:r>
+              <a:rPr lang="en-US" dirty="0">
+                <a:latin typeface="Helvetica" pitchFamily="2" charset="0"/>
+              </a:rPr>
+              <a:t>(2)</a:t>
+            </a:r>
+          </a:p>
+        </p:txBody>
+      </p:sp>
+      <p:sp>
+        <p:nvSpPr>
+          <p:cNvPr id="2" name="TextBox 1">
+            <a:extLst>
+              <a:ext uri="{FF2B5EF4-FFF2-40B4-BE49-F238E27FC236}">
+                <a16:creationId xmlns:a16="http://schemas.microsoft.com/office/drawing/2014/main" id="{80D38535-630C-8046-3179-F0CAE4891ECD}"/>
+              </a:ext>
+            </a:extLst>
+          </p:cNvPr>
+          <p:cNvSpPr txBox="1"/>
+          <p:nvPr/>
+        </p:nvSpPr>
+        <p:spPr>
+          <a:xfrm>
+            <a:off x="3438" y="1658007"/>
+            <a:ext cx="2187587" cy="461665"/>
+          </a:xfrm>
+          <a:prstGeom prst="rect">
+            <a:avLst/>
+          </a:prstGeom>
+          <a:noFill/>
+        </p:spPr>
+        <p:txBody>
+          <a:bodyPr wrap="none" rtlCol="0">
+            <a:spAutoFit/>
+          </a:bodyPr>
+          <a:lstStyle/>
+          <a:p>
+            <a:r>
+              <a:rPr lang="en-US" sz="2400" dirty="0">
+                <a:latin typeface="Helvetica" pitchFamily="2" charset="0"/>
+              </a:rPr>
+              <a:t>(A) Articulation</a:t>
+            </a:r>
+          </a:p>
+        </p:txBody>
+      </p:sp>
+      <p:cxnSp>
+        <p:nvCxnSpPr>
+          <p:cNvPr id="27" name="Straight Connector 26">
+            <a:extLst>
+              <a:ext uri="{FF2B5EF4-FFF2-40B4-BE49-F238E27FC236}">
+                <a16:creationId xmlns:a16="http://schemas.microsoft.com/office/drawing/2014/main" id="{1DCBC20E-7D15-543C-37BB-A6ABB1B7317B}"/>
+              </a:ext>
+            </a:extLst>
+          </p:cNvPr>
+          <p:cNvCxnSpPr>
+            <a:cxnSpLocks/>
+          </p:cNvCxnSpPr>
+          <p:nvPr/>
+        </p:nvCxnSpPr>
+        <p:spPr>
+          <a:xfrm>
+            <a:off x="6072245" y="3508023"/>
             <a:ext cx="2189497" cy="0"/>
           </a:xfrm>
           <a:prstGeom prst="line">
@@ -3987,10 +4192,10 @@
       </p:cxnSp>
       <p:sp>
         <p:nvSpPr>
-          <p:cNvPr id="16" name="TextBox 15">
-            <a:extLst>
-              <a:ext uri="{FF2B5EF4-FFF2-40B4-BE49-F238E27FC236}">
-                <a16:creationId xmlns:a16="http://schemas.microsoft.com/office/drawing/2014/main" id="{E37A3589-B25C-3C85-ADE9-0B87AD2D4DDE}"/>
+          <p:cNvPr id="28" name="TextBox 27">
+            <a:extLst>
+              <a:ext uri="{FF2B5EF4-FFF2-40B4-BE49-F238E27FC236}">
+                <a16:creationId xmlns:a16="http://schemas.microsoft.com/office/drawing/2014/main" id="{55362EE4-AAA0-F90E-A18F-BAE1E3DDA4DB}"/>
               </a:ext>
             </a:extLst>
           </p:cNvPr>
@@ -3999,7 +4204,7 @@
         </p:nvSpPr>
         <p:spPr>
           <a:xfrm>
-            <a:off x="8909478" y="4611512"/>
+            <a:off x="6933596" y="3323357"/>
             <a:ext cx="466794" cy="369332"/>
           </a:xfrm>
           <a:prstGeom prst="rect">
@@ -4026,10 +4231,10 @@
       </p:sp>
       <p:cxnSp>
         <p:nvCxnSpPr>
-          <p:cNvPr id="17" name="Straight Connector 16">
-            <a:extLst>
-              <a:ext uri="{FF2B5EF4-FFF2-40B4-BE49-F238E27FC236}">
-                <a16:creationId xmlns:a16="http://schemas.microsoft.com/office/drawing/2014/main" id="{067D2C7B-2CBD-9D04-0142-CF37FACAE1CC}"/>
+          <p:cNvPr id="29" name="Straight Connector 28">
+            <a:extLst>
+              <a:ext uri="{FF2B5EF4-FFF2-40B4-BE49-F238E27FC236}">
+                <a16:creationId xmlns:a16="http://schemas.microsoft.com/office/drawing/2014/main" id="{29BD99A3-0B28-0E20-CC0C-6137EDEFD55C}"/>
               </a:ext>
             </a:extLst>
           </p:cNvPr>
@@ -4040,7 +4245,91 @@
         </p:nvCxnSpPr>
         <p:spPr>
           <a:xfrm>
-            <a:off x="6073422" y="3508023"/>
+            <a:off x="8511772" y="3508023"/>
+            <a:ext cx="2189497" cy="0"/>
+          </a:xfrm>
+          <a:prstGeom prst="line">
+            <a:avLst/>
+          </a:prstGeom>
+          <a:ln w="25400" cap="flat">
+            <a:solidFill>
+              <a:schemeClr val="tx1"/>
+            </a:solidFill>
+            <a:headEnd type="oval" w="lg" len="lg"/>
+            <a:tailEnd type="oval" w="lg" len="lg"/>
+          </a:ln>
+        </p:spPr>
+        <p:style>
+          <a:lnRef idx="1">
+            <a:schemeClr val="dk1"/>
+          </a:lnRef>
+          <a:fillRef idx="0">
+            <a:schemeClr val="dk1"/>
+          </a:fillRef>
+          <a:effectRef idx="0">
+            <a:schemeClr val="dk1"/>
+          </a:effectRef>
+          <a:fontRef idx="minor">
+            <a:schemeClr val="tx1"/>
+          </a:fontRef>
+        </p:style>
+      </p:cxnSp>
+      <p:sp>
+        <p:nvSpPr>
+          <p:cNvPr id="30" name="TextBox 29">
+            <a:extLst>
+              <a:ext uri="{FF2B5EF4-FFF2-40B4-BE49-F238E27FC236}">
+                <a16:creationId xmlns:a16="http://schemas.microsoft.com/office/drawing/2014/main" id="{3BD709A6-9C16-2BA8-3D44-490592C2CCB5}"/>
+              </a:ext>
+            </a:extLst>
+          </p:cNvPr>
+          <p:cNvSpPr txBox="1"/>
+          <p:nvPr/>
+        </p:nvSpPr>
+        <p:spPr>
+          <a:xfrm>
+            <a:off x="9373123" y="3323357"/>
+            <a:ext cx="466794" cy="369332"/>
+          </a:xfrm>
+          <a:prstGeom prst="rect">
+            <a:avLst/>
+          </a:prstGeom>
+          <a:solidFill>
+            <a:schemeClr val="bg1"/>
+          </a:solidFill>
+        </p:spPr>
+        <p:txBody>
+          <a:bodyPr wrap="none" rtlCol="0">
+            <a:spAutoFit/>
+          </a:bodyPr>
+          <a:lstStyle/>
+          <a:p>
+            <a:r>
+              <a:rPr lang="en-US" dirty="0">
+                <a:latin typeface="Helvetica" pitchFamily="2" charset="0"/>
+              </a:rPr>
+              <a:t>(2)</a:t>
+            </a:r>
+          </a:p>
+        </p:txBody>
+      </p:sp>
+      <p:cxnSp>
+        <p:nvCxnSpPr>
+          <p:cNvPr id="31" name="Straight Connector 30">
+            <a:extLst>
+              <a:ext uri="{FF2B5EF4-FFF2-40B4-BE49-F238E27FC236}">
+                <a16:creationId xmlns:a16="http://schemas.microsoft.com/office/drawing/2014/main" id="{CE57028D-D765-0029-644B-90BD9D6BE7FE}"/>
+              </a:ext>
+            </a:extLst>
+          </p:cNvPr>
+          <p:cNvCxnSpPr>
+            <a:cxnSpLocks/>
+          </p:cNvCxnSpPr>
+          <p:nvPr/>
+        </p:nvCxnSpPr>
+        <p:spPr>
+          <a:xfrm>
+            <a:off x="8044978" y="4796178"/>
             <a:ext cx="2189497" cy="0"/>
           </a:xfrm>
           <a:prstGeom prst="line">
@@ -4071,10 +4360,10 @@
       </p:cxnSp>
       <p:sp>
         <p:nvSpPr>
-          <p:cNvPr id="18" name="TextBox 17">
-            <a:extLst>
-              <a:ext uri="{FF2B5EF4-FFF2-40B4-BE49-F238E27FC236}">
-                <a16:creationId xmlns:a16="http://schemas.microsoft.com/office/drawing/2014/main" id="{5E00A22E-E696-228F-ED11-955D0C5C6C4E}"/>
+          <p:cNvPr id="32" name="TextBox 31">
+            <a:extLst>
+              <a:ext uri="{FF2B5EF4-FFF2-40B4-BE49-F238E27FC236}">
+                <a16:creationId xmlns:a16="http://schemas.microsoft.com/office/drawing/2014/main" id="{766B30EE-B786-6761-214A-29422E271FBE}"/>
               </a:ext>
             </a:extLst>
           </p:cNvPr>
@@ -4083,7 +4372,7 @@
         </p:nvSpPr>
         <p:spPr>
           <a:xfrm>
-            <a:off x="6934773" y="3323357"/>
+            <a:off x="8906329" y="4611512"/>
             <a:ext cx="466794" cy="369332"/>
           </a:xfrm>
           <a:prstGeom prst="rect">
@@ -4110,10 +4399,10 @@
       </p:sp>
       <p:cxnSp>
         <p:nvCxnSpPr>
-          <p:cNvPr id="19" name="Straight Connector 18">
-            <a:extLst>
-              <a:ext uri="{FF2B5EF4-FFF2-40B4-BE49-F238E27FC236}">
-                <a16:creationId xmlns:a16="http://schemas.microsoft.com/office/drawing/2014/main" id="{DA91D2E6-8C76-D62C-D566-86191D534AA6}"/>
+          <p:cNvPr id="33" name="Straight Connector 32">
+            <a:extLst>
+              <a:ext uri="{FF2B5EF4-FFF2-40B4-BE49-F238E27FC236}">
+                <a16:creationId xmlns:a16="http://schemas.microsoft.com/office/drawing/2014/main" id="{F1F1299F-A298-3827-34FE-E0694C7468BA}"/>
               </a:ext>
             </a:extLst>
           </p:cNvPr>
@@ -4124,7 +4413,7 @@
         </p:nvCxnSpPr>
         <p:spPr>
           <a:xfrm>
-            <a:off x="3486289" y="3508023"/>
+            <a:off x="5648496" y="4802021"/>
             <a:ext cx="2189497" cy="0"/>
           </a:xfrm>
           <a:prstGeom prst="line">
@@ -4155,10 +4444,10 @@
       </p:cxnSp>
       <p:sp>
         <p:nvSpPr>
-          <p:cNvPr id="20" name="TextBox 19">
-            <a:extLst>
-              <a:ext uri="{FF2B5EF4-FFF2-40B4-BE49-F238E27FC236}">
-                <a16:creationId xmlns:a16="http://schemas.microsoft.com/office/drawing/2014/main" id="{B093F44A-755B-1FA2-8A36-1C3E31C7BF4C}"/>
+          <p:cNvPr id="34" name="TextBox 33">
+            <a:extLst>
+              <a:ext uri="{FF2B5EF4-FFF2-40B4-BE49-F238E27FC236}">
+                <a16:creationId xmlns:a16="http://schemas.microsoft.com/office/drawing/2014/main" id="{39783ADE-E2E7-2CFD-0610-E7A0F02540C7}"/>
               </a:ext>
             </a:extLst>
           </p:cNvPr>
@@ -4167,7 +4456,7 @@
         </p:nvSpPr>
         <p:spPr>
           <a:xfrm>
-            <a:off x="4347640" y="3323357"/>
+            <a:off x="6509847" y="4617355"/>
             <a:ext cx="466794" cy="369332"/>
           </a:xfrm>
           <a:prstGeom prst="rect">
@@ -4188,295 +4477,6 @@
                 <a:latin typeface="Helvetica" pitchFamily="2" charset="0"/>
               </a:rPr>
               <a:t>(2)</a:t>
-            </a:r>
-          </a:p>
-        </p:txBody>
-      </p:sp>
-      <p:cxnSp>
-        <p:nvCxnSpPr>
-          <p:cNvPr id="21" name="Straight Connector 20">
-            <a:extLst>
-              <a:ext uri="{FF2B5EF4-FFF2-40B4-BE49-F238E27FC236}">
-                <a16:creationId xmlns:a16="http://schemas.microsoft.com/office/drawing/2014/main" id="{FBA34B6C-7326-A009-CC36-F5F8E247B62B}"/>
-              </a:ext>
-            </a:extLst>
-          </p:cNvPr>
-          <p:cNvCxnSpPr>
-            <a:cxnSpLocks/>
-          </p:cNvCxnSpPr>
-          <p:nvPr/>
-        </p:nvCxnSpPr>
-        <p:spPr>
-          <a:xfrm>
-            <a:off x="8512948" y="3508023"/>
-            <a:ext cx="2189497" cy="0"/>
-          </a:xfrm>
-          <a:prstGeom prst="line">
-            <a:avLst/>
-          </a:prstGeom>
-          <a:ln w="25400" cap="flat">
-            <a:solidFill>
-              <a:schemeClr val="tx1"/>
-            </a:solidFill>
-            <a:headEnd type="oval" w="lg" len="lg"/>
-            <a:tailEnd type="oval" w="lg" len="lg"/>
-          </a:ln>
-        </p:spPr>
-        <p:style>
-          <a:lnRef idx="1">
-            <a:schemeClr val="dk1"/>
-          </a:lnRef>
-          <a:fillRef idx="0">
-            <a:schemeClr val="dk1"/>
-          </a:fillRef>
-          <a:effectRef idx="0">
-            <a:schemeClr val="dk1"/>
-          </a:effectRef>
-          <a:fontRef idx="minor">
-            <a:schemeClr val="tx1"/>
-          </a:fontRef>
-        </p:style>
-      </p:cxnSp>
-      <p:sp>
-        <p:nvSpPr>
-          <p:cNvPr id="22" name="TextBox 21">
-            <a:extLst>
-              <a:ext uri="{FF2B5EF4-FFF2-40B4-BE49-F238E27FC236}">
-                <a16:creationId xmlns:a16="http://schemas.microsoft.com/office/drawing/2014/main" id="{746BA251-B60D-E04D-815C-5B65D2244C44}"/>
-              </a:ext>
-            </a:extLst>
-          </p:cNvPr>
-          <p:cNvSpPr txBox="1"/>
-          <p:nvPr/>
-        </p:nvSpPr>
-        <p:spPr>
-          <a:xfrm>
-            <a:off x="9374299" y="3323357"/>
-            <a:ext cx="466794" cy="369332"/>
-          </a:xfrm>
-          <a:prstGeom prst="rect">
-            <a:avLst/>
-          </a:prstGeom>
-          <a:solidFill>
-            <a:schemeClr val="bg1"/>
-          </a:solidFill>
-        </p:spPr>
-        <p:txBody>
-          <a:bodyPr wrap="none" rtlCol="0">
-            <a:spAutoFit/>
-          </a:bodyPr>
-          <a:lstStyle/>
-          <a:p>
-            <a:r>
-              <a:rPr lang="en-US" dirty="0">
-                <a:latin typeface="Helvetica" pitchFamily="2" charset="0"/>
-              </a:rPr>
-              <a:t>(2)</a:t>
-            </a:r>
-          </a:p>
-        </p:txBody>
-      </p:sp>
-      <p:cxnSp>
-        <p:nvCxnSpPr>
-          <p:cNvPr id="23" name="Straight Connector 22">
-            <a:extLst>
-              <a:ext uri="{FF2B5EF4-FFF2-40B4-BE49-F238E27FC236}">
-                <a16:creationId xmlns:a16="http://schemas.microsoft.com/office/drawing/2014/main" id="{5B50780C-FBE1-498C-25A9-15748429A085}"/>
-              </a:ext>
-            </a:extLst>
-          </p:cNvPr>
-          <p:cNvCxnSpPr>
-            <a:cxnSpLocks/>
-          </p:cNvCxnSpPr>
-          <p:nvPr/>
-        </p:nvCxnSpPr>
-        <p:spPr>
-          <a:xfrm>
-            <a:off x="680426" y="4802021"/>
-            <a:ext cx="2189497" cy="0"/>
-          </a:xfrm>
-          <a:prstGeom prst="line">
-            <a:avLst/>
-          </a:prstGeom>
-          <a:ln w="25400" cap="flat">
-            <a:solidFill>
-              <a:schemeClr val="tx1"/>
-            </a:solidFill>
-            <a:headEnd type="oval" w="lg" len="lg"/>
-            <a:tailEnd type="oval" w="lg" len="lg"/>
-          </a:ln>
-        </p:spPr>
-        <p:style>
-          <a:lnRef idx="1">
-            <a:schemeClr val="dk1"/>
-          </a:lnRef>
-          <a:fillRef idx="0">
-            <a:schemeClr val="dk1"/>
-          </a:fillRef>
-          <a:effectRef idx="0">
-            <a:schemeClr val="dk1"/>
-          </a:effectRef>
-          <a:fontRef idx="minor">
-            <a:schemeClr val="tx1"/>
-          </a:fontRef>
-        </p:style>
-      </p:cxnSp>
-      <p:sp>
-        <p:nvSpPr>
-          <p:cNvPr id="24" name="TextBox 23">
-            <a:extLst>
-              <a:ext uri="{FF2B5EF4-FFF2-40B4-BE49-F238E27FC236}">
-                <a16:creationId xmlns:a16="http://schemas.microsoft.com/office/drawing/2014/main" id="{58F537FC-32DA-31F8-078E-4CE307BFBE80}"/>
-              </a:ext>
-            </a:extLst>
-          </p:cNvPr>
-          <p:cNvSpPr txBox="1"/>
-          <p:nvPr/>
-        </p:nvSpPr>
-        <p:spPr>
-          <a:xfrm>
-            <a:off x="1541777" y="4617355"/>
-            <a:ext cx="466794" cy="369332"/>
-          </a:xfrm>
-          <a:prstGeom prst="rect">
-            <a:avLst/>
-          </a:prstGeom>
-          <a:solidFill>
-            <a:schemeClr val="bg1"/>
-          </a:solidFill>
-        </p:spPr>
-        <p:txBody>
-          <a:bodyPr wrap="none" rtlCol="0">
-            <a:spAutoFit/>
-          </a:bodyPr>
-          <a:lstStyle/>
-          <a:p>
-            <a:r>
-              <a:rPr lang="en-US" dirty="0">
-                <a:latin typeface="Helvetica" pitchFamily="2" charset="0"/>
-              </a:rPr>
-              <a:t>(2)</a:t>
-            </a:r>
-          </a:p>
-        </p:txBody>
-      </p:sp>
-      <p:cxnSp>
-        <p:nvCxnSpPr>
-          <p:cNvPr id="25" name="Straight Connector 24">
-            <a:extLst>
-              <a:ext uri="{FF2B5EF4-FFF2-40B4-BE49-F238E27FC236}">
-                <a16:creationId xmlns:a16="http://schemas.microsoft.com/office/drawing/2014/main" id="{33DB6B6F-7238-A6F5-5AEC-5F759EF860D9}"/>
-              </a:ext>
-            </a:extLst>
-          </p:cNvPr>
-          <p:cNvCxnSpPr>
-            <a:cxnSpLocks/>
-          </p:cNvCxnSpPr>
-          <p:nvPr/>
-        </p:nvCxnSpPr>
-        <p:spPr>
-          <a:xfrm>
-            <a:off x="5642466" y="4790732"/>
-            <a:ext cx="2189497" cy="0"/>
-          </a:xfrm>
-          <a:prstGeom prst="line">
-            <a:avLst/>
-          </a:prstGeom>
-          <a:ln w="25400" cap="flat">
-            <a:solidFill>
-              <a:schemeClr val="tx1"/>
-            </a:solidFill>
-            <a:headEnd type="oval" w="lg" len="lg"/>
-            <a:tailEnd type="oval" w="lg" len="lg"/>
-          </a:ln>
-        </p:spPr>
-        <p:style>
-          <a:lnRef idx="1">
-            <a:schemeClr val="dk1"/>
-          </a:lnRef>
-          <a:fillRef idx="0">
-            <a:schemeClr val="dk1"/>
-          </a:fillRef>
-          <a:effectRef idx="0">
-            <a:schemeClr val="dk1"/>
-          </a:effectRef>
-          <a:fontRef idx="minor">
-            <a:schemeClr val="tx1"/>
-          </a:fontRef>
-        </p:style>
-      </p:cxnSp>
-      <p:sp>
-        <p:nvSpPr>
-          <p:cNvPr id="26" name="TextBox 25">
-            <a:extLst>
-              <a:ext uri="{FF2B5EF4-FFF2-40B4-BE49-F238E27FC236}">
-                <a16:creationId xmlns:a16="http://schemas.microsoft.com/office/drawing/2014/main" id="{8ACB486C-4451-E53B-DC2E-34FF7987775B}"/>
-              </a:ext>
-            </a:extLst>
-          </p:cNvPr>
-          <p:cNvSpPr txBox="1"/>
-          <p:nvPr/>
-        </p:nvSpPr>
-        <p:spPr>
-          <a:xfrm>
-            <a:off x="6503817" y="4606066"/>
-            <a:ext cx="466794" cy="369332"/>
-          </a:xfrm>
-          <a:prstGeom prst="rect">
-            <a:avLst/>
-          </a:prstGeom>
-          <a:solidFill>
-            <a:schemeClr val="bg1"/>
-          </a:solidFill>
-        </p:spPr>
-        <p:txBody>
-          <a:bodyPr wrap="none" rtlCol="0">
-            <a:spAutoFit/>
-          </a:bodyPr>
-          <a:lstStyle/>
-          <a:p>
-            <a:r>
-              <a:rPr lang="en-US" dirty="0">
-                <a:latin typeface="Helvetica" pitchFamily="2" charset="0"/>
-              </a:rPr>
-              <a:t>(2)</a:t>
-            </a:r>
-          </a:p>
-        </p:txBody>
-      </p:sp>
-      <p:sp>
-        <p:nvSpPr>
-          <p:cNvPr id="2" name="TextBox 1">
-            <a:extLst>
-              <a:ext uri="{FF2B5EF4-FFF2-40B4-BE49-F238E27FC236}">
-                <a16:creationId xmlns:a16="http://schemas.microsoft.com/office/drawing/2014/main" id="{80D38535-630C-8046-3179-F0CAE4891ECD}"/>
-              </a:ext>
-            </a:extLst>
-          </p:cNvPr>
-          <p:cNvSpPr txBox="1"/>
-          <p:nvPr/>
-        </p:nvSpPr>
-        <p:spPr>
-          <a:xfrm>
-            <a:off x="3438" y="1658007"/>
-            <a:ext cx="2187587" cy="461665"/>
-          </a:xfrm>
-          <a:prstGeom prst="rect">
-            <a:avLst/>
-          </a:prstGeom>
-          <a:noFill/>
-        </p:spPr>
-        <p:txBody>
-          <a:bodyPr wrap="none" rtlCol="0">
-            <a:spAutoFit/>
-          </a:bodyPr>
-          <a:lstStyle/>
-          <a:p>
-            <a:r>
-              <a:rPr lang="en-US" sz="2400" dirty="0">
-                <a:latin typeface="Helvetica" pitchFamily="2" charset="0"/>
-              </a:rPr>
-              <a:t>(A) Articulation</a:t>
             </a:r>
           </a:p>
         </p:txBody>

</xml_diff>